<commit_message>
adding .ppt presentation updates
</commit_message>
<xml_diff>
--- a/Capstone2/capstone2Writeups/PredictingFantasyPoints.pptx
+++ b/Capstone2/capstone2Writeups/PredictingFantasyPoints.pptx
@@ -10,6 +10,7 @@
     <p:sldId id="258" r:id="rId4"/>
     <p:sldId id="259" r:id="rId5"/>
     <p:sldId id="260" r:id="rId6"/>
+    <p:sldId id="261" r:id="rId7"/>
   </p:sldIdLst>
   <p:sldSz cx="12192000" cy="6858000"/>
   <p:notesSz cx="6858000" cy="9144000"/>
@@ -108,6 +109,11 @@
       </a:defRPr>
     </a:lvl9pPr>
   </p:defaultTextStyle>
+  <p:extLst>
+    <p:ext uri="{EFAFB233-063F-42B5-8137-9DF3F51BA10A}">
+      <p15:sldGuideLst xmlns:p15="http://schemas.microsoft.com/office/powerpoint/2012/main"/>
+    </p:ext>
+  </p:extLst>
 </p:presentation>
 </file>
 
@@ -857,7 +863,7 @@
             <a:fld id="{B61BEF0D-F0BB-DE4B-95CE-6DB70DBA9567}" type="datetimeFigureOut">
               <a:rPr lang="en-US" dirty="0"/>
               <a:pPr/>
-              <a:t>10/8/2019</a:t>
+              <a:t>10/23/2019</a:t>
             </a:fld>
             <a:endParaRPr lang="en-US" dirty="0"/>
           </a:p>
@@ -1105,7 +1111,7 @@
             <a:fld id="{B61BEF0D-F0BB-DE4B-95CE-6DB70DBA9567}" type="datetimeFigureOut">
               <a:rPr lang="en-US" dirty="0"/>
               <a:pPr/>
-              <a:t>10/8/2019</a:t>
+              <a:t>10/23/2019</a:t>
             </a:fld>
             <a:endParaRPr lang="en-US" dirty="0"/>
           </a:p>
@@ -1416,7 +1422,7 @@
             <a:fld id="{B61BEF0D-F0BB-DE4B-95CE-6DB70DBA9567}" type="datetimeFigureOut">
               <a:rPr lang="en-US" dirty="0"/>
               <a:pPr/>
-              <a:t>10/8/2019</a:t>
+              <a:t>10/23/2019</a:t>
             </a:fld>
             <a:endParaRPr lang="en-US" dirty="0"/>
           </a:p>
@@ -1746,7 +1752,7 @@
             <a:fld id="{B61BEF0D-F0BB-DE4B-95CE-6DB70DBA9567}" type="datetimeFigureOut">
               <a:rPr lang="en-US" dirty="0"/>
               <a:pPr/>
-              <a:t>10/8/2019</a:t>
+              <a:t>10/23/2019</a:t>
             </a:fld>
             <a:endParaRPr lang="en-US" dirty="0"/>
           </a:p>
@@ -2057,7 +2063,7 @@
             <a:fld id="{B61BEF0D-F0BB-DE4B-95CE-6DB70DBA9567}" type="datetimeFigureOut">
               <a:rPr lang="en-US" dirty="0"/>
               <a:pPr/>
-              <a:t>10/8/2019</a:t>
+              <a:t>10/23/2019</a:t>
             </a:fld>
             <a:endParaRPr lang="en-US" dirty="0"/>
           </a:p>
@@ -2447,7 +2453,7 @@
             <a:fld id="{B61BEF0D-F0BB-DE4B-95CE-6DB70DBA9567}" type="datetimeFigureOut">
               <a:rPr lang="en-US" dirty="0"/>
               <a:pPr/>
-              <a:t>10/8/2019</a:t>
+              <a:t>10/23/2019</a:t>
             </a:fld>
             <a:endParaRPr lang="en-US" dirty="0"/>
           </a:p>
@@ -2613,7 +2619,7 @@
           <a:p>
             <a:fld id="{55C6B4A9-1611-4792-9094-5F34BCA07E0B}" type="datetimeFigureOut">
               <a:rPr lang="en-US" dirty="0"/>
-              <a:t>10/8/2019</a:t>
+              <a:t>10/23/2019</a:t>
             </a:fld>
             <a:endParaRPr lang="en-US" dirty="0"/>
           </a:p>
@@ -2789,7 +2795,7 @@
             <a:fld id="{B61BEF0D-F0BB-DE4B-95CE-6DB70DBA9567}" type="datetimeFigureOut">
               <a:rPr lang="en-US" dirty="0"/>
               <a:pPr/>
-              <a:t>10/8/2019</a:t>
+              <a:t>10/23/2019</a:t>
             </a:fld>
             <a:endParaRPr lang="en-US" dirty="0"/>
           </a:p>
@@ -2955,7 +2961,7 @@
           <a:p>
             <a:fld id="{42A54C80-263E-416B-A8E0-580EDEADCBDC}" type="datetimeFigureOut">
               <a:rPr lang="en-US" dirty="0"/>
-              <a:t>10/8/2019</a:t>
+              <a:t>10/23/2019</a:t>
             </a:fld>
             <a:endParaRPr lang="en-US" dirty="0"/>
           </a:p>
@@ -3198,7 +3204,7 @@
             <a:fld id="{B61BEF0D-F0BB-DE4B-95CE-6DB70DBA9567}" type="datetimeFigureOut">
               <a:rPr lang="en-US" dirty="0"/>
               <a:pPr/>
-              <a:t>10/8/2019</a:t>
+              <a:t>10/23/2019</a:t>
             </a:fld>
             <a:endParaRPr lang="en-US" dirty="0"/>
           </a:p>
@@ -3426,7 +3432,7 @@
           <a:p>
             <a:fld id="{42A54C80-263E-416B-A8E0-580EDEADCBDC}" type="datetimeFigureOut">
               <a:rPr lang="en-US" dirty="0"/>
-              <a:t>10/8/2019</a:t>
+              <a:t>10/23/2019</a:t>
             </a:fld>
             <a:endParaRPr lang="en-US" dirty="0"/>
           </a:p>
@@ -3796,7 +3802,7 @@
             <a:fld id="{B61BEF0D-F0BB-DE4B-95CE-6DB70DBA9567}" type="datetimeFigureOut">
               <a:rPr lang="en-US" dirty="0"/>
               <a:pPr/>
-              <a:t>10/8/2019</a:t>
+              <a:t>10/23/2019</a:t>
             </a:fld>
             <a:endParaRPr lang="en-US" dirty="0"/>
           </a:p>
@@ -3916,7 +3922,7 @@
             <a:fld id="{B61BEF0D-F0BB-DE4B-95CE-6DB70DBA9567}" type="datetimeFigureOut">
               <a:rPr lang="en-US" dirty="0"/>
               <a:pPr/>
-              <a:t>10/8/2019</a:t>
+              <a:t>10/23/2019</a:t>
             </a:fld>
             <a:endParaRPr lang="en-US" dirty="0"/>
           </a:p>
@@ -4008,7 +4014,7 @@
             <a:fld id="{B61BEF0D-F0BB-DE4B-95CE-6DB70DBA9567}" type="datetimeFigureOut">
               <a:rPr lang="en-US" dirty="0"/>
               <a:pPr/>
-              <a:t>10/8/2019</a:t>
+              <a:t>10/23/2019</a:t>
             </a:fld>
             <a:endParaRPr lang="en-US" dirty="0"/>
           </a:p>
@@ -4259,7 +4265,7 @@
           <a:p>
             <a:fld id="{42A54C80-263E-416B-A8E0-580EDEADCBDC}" type="datetimeFigureOut">
               <a:rPr lang="en-US" dirty="0"/>
-              <a:t>10/8/2019</a:t>
+              <a:t>10/23/2019</a:t>
             </a:fld>
             <a:endParaRPr lang="en-US" dirty="0"/>
           </a:p>
@@ -4561,7 +4567,7 @@
             <a:fld id="{B61BEF0D-F0BB-DE4B-95CE-6DB70DBA9567}" type="datetimeFigureOut">
               <a:rPr lang="en-US" dirty="0"/>
               <a:pPr/>
-              <a:t>10/8/2019</a:t>
+              <a:t>10/23/2019</a:t>
             </a:fld>
             <a:endParaRPr lang="en-US" dirty="0"/>
           </a:p>
@@ -5259,7 +5265,7 @@
             <a:fld id="{B61BEF0D-F0BB-DE4B-95CE-6DB70DBA9567}" type="datetimeFigureOut">
               <a:rPr lang="en-US" dirty="0"/>
               <a:pPr/>
-              <a:t>10/8/2019</a:t>
+              <a:t>10/23/2019</a:t>
             </a:fld>
             <a:endParaRPr lang="en-US" dirty="0"/>
           </a:p>
@@ -6249,7 +6255,17 @@
             </a:r>
             <a:r>
               <a:rPr lang="en-US" dirty="0" smtClean="0"/>
-              <a:t>’ are better</a:t>
+              <a:t>’ are </a:t>
+            </a:r>
+            <a:r>
+              <a:rPr lang="en-US" dirty="0" smtClean="0"/>
+              <a:t>better</a:t>
+            </a:r>
+          </a:p>
+          <a:p>
+            <a:r>
+              <a:rPr lang="en-US" dirty="0" smtClean="0"/>
+              <a:t>Target QB’s who are favored to win</a:t>
             </a:r>
           </a:p>
         </p:txBody>
@@ -6288,6 +6304,170 @@
     <p:extLst>
       <p:ext uri="{BB962C8B-B14F-4D97-AF65-F5344CB8AC3E}">
         <p14:creationId xmlns:p14="http://schemas.microsoft.com/office/powerpoint/2010/main" val="4039692636"/>
+      </p:ext>
+    </p:extLst>
+  </p:cSld>
+  <p:clrMapOvr>
+    <a:masterClrMapping/>
+  </p:clrMapOvr>
+</p:sld>
+</file>
+
+<file path=ppt/slides/slide6.xml><?xml version="1.0" encoding="utf-8"?>
+<p:sld xmlns:a="http://schemas.openxmlformats.org/drawingml/2006/main" xmlns:r="http://schemas.openxmlformats.org/officeDocument/2006/relationships" xmlns:p="http://schemas.openxmlformats.org/presentationml/2006/main">
+  <p:cSld>
+    <p:spTree>
+      <p:nvGrpSpPr>
+        <p:cNvPr id="1" name=""/>
+        <p:cNvGrpSpPr/>
+        <p:nvPr/>
+      </p:nvGrpSpPr>
+      <p:grpSpPr>
+        <a:xfrm>
+          <a:off x="0" y="0"/>
+          <a:ext cx="0" cy="0"/>
+          <a:chOff x="0" y="0"/>
+          <a:chExt cx="0" cy="0"/>
+        </a:xfrm>
+      </p:grpSpPr>
+      <p:sp>
+        <p:nvSpPr>
+          <p:cNvPr id="2" name="Title 1"/>
+          <p:cNvSpPr>
+            <a:spLocks noGrp="1"/>
+          </p:cNvSpPr>
+          <p:nvPr>
+            <p:ph type="title"/>
+          </p:nvPr>
+        </p:nvSpPr>
+        <p:spPr/>
+        <p:txBody>
+          <a:bodyPr/>
+          <a:lstStyle/>
+          <a:p>
+            <a:r>
+              <a:rPr lang="en-US" dirty="0" smtClean="0"/>
+              <a:t>Model Building</a:t>
+            </a:r>
+            <a:endParaRPr lang="en-US" dirty="0"/>
+          </a:p>
+        </p:txBody>
+      </p:sp>
+      <p:sp>
+        <p:nvSpPr>
+          <p:cNvPr id="3" name="Content Placeholder 2"/>
+          <p:cNvSpPr>
+            <a:spLocks noGrp="1"/>
+          </p:cNvSpPr>
+          <p:nvPr>
+            <p:ph idx="1"/>
+          </p:nvPr>
+        </p:nvSpPr>
+        <p:spPr>
+          <a:xfrm>
+            <a:off x="677334" y="1470779"/>
+            <a:ext cx="8596668" cy="3880773"/>
+          </a:xfrm>
+        </p:spPr>
+        <p:txBody>
+          <a:bodyPr>
+            <a:noAutofit/>
+          </a:bodyPr>
+          <a:lstStyle/>
+          <a:p>
+            <a:r>
+              <a:rPr lang="en-US" sz="2000" dirty="0" err="1" smtClean="0"/>
+              <a:t>XGBoost</a:t>
+            </a:r>
+            <a:r>
+              <a:rPr lang="en-US" sz="2000" dirty="0" smtClean="0"/>
+              <a:t>, Random Forest </a:t>
+            </a:r>
+            <a:r>
+              <a:rPr lang="en-US" sz="2000" dirty="0" err="1" smtClean="0"/>
+              <a:t>Regressor</a:t>
+            </a:r>
+            <a:r>
+              <a:rPr lang="en-US" sz="2000" dirty="0" smtClean="0"/>
+              <a:t>, and Lasso Regression were used for predicting QB fantasy points</a:t>
+            </a:r>
+          </a:p>
+          <a:p>
+            <a:r>
+              <a:rPr lang="en-US" sz="2000" dirty="0" smtClean="0"/>
+              <a:t>All three algorithms outperformed </a:t>
+            </a:r>
+            <a:r>
+              <a:rPr lang="en-US" sz="2000" dirty="0" err="1" smtClean="0"/>
+              <a:t>fantasydata’s</a:t>
+            </a:r>
+            <a:r>
+              <a:rPr lang="en-US" sz="2000" dirty="0" smtClean="0"/>
+              <a:t> projections</a:t>
+            </a:r>
+          </a:p>
+          <a:p>
+            <a:pPr lvl="1"/>
+            <a:r>
+              <a:rPr lang="en-US" sz="2000" dirty="0" smtClean="0"/>
+              <a:t>Lasso performed the best</a:t>
+            </a:r>
+          </a:p>
+          <a:p>
+            <a:r>
+              <a:rPr lang="en-US" sz="2000" dirty="0" smtClean="0"/>
+              <a:t>A quarterback’s points largely depend on:</a:t>
+            </a:r>
+          </a:p>
+          <a:p>
+            <a:pPr lvl="2"/>
+            <a:r>
+              <a:rPr lang="en-US" sz="2000" dirty="0" smtClean="0"/>
+              <a:t>Opponent’s defensive skill</a:t>
+            </a:r>
+          </a:p>
+          <a:p>
+            <a:pPr lvl="2"/>
+            <a:r>
+              <a:rPr lang="en-US" sz="2000" dirty="0" smtClean="0"/>
+              <a:t>The QB’s avg. fantasy points over the most recent 7 performances</a:t>
+            </a:r>
+          </a:p>
+          <a:p>
+            <a:pPr lvl="2"/>
+            <a:r>
+              <a:rPr lang="en-US" sz="2000" dirty="0" smtClean="0"/>
+              <a:t>The receiving weapons he has at his disposal</a:t>
+            </a:r>
+          </a:p>
+          <a:p>
+            <a:pPr lvl="2"/>
+            <a:r>
+              <a:rPr lang="en-US" sz="2000" dirty="0" smtClean="0"/>
+              <a:t>His Vegas implied team total</a:t>
+            </a:r>
+          </a:p>
+          <a:p>
+            <a:r>
+              <a:rPr lang="en-US" sz="2000" dirty="0" smtClean="0"/>
+              <a:t>Using our Lasso Model, a fantasy football player can pick his quarterback with more confidence than using </a:t>
+            </a:r>
+            <a:r>
+              <a:rPr lang="en-US" sz="2000" dirty="0" err="1" smtClean="0"/>
+              <a:t>fantasydata.com’s</a:t>
+            </a:r>
+            <a:r>
+              <a:rPr lang="en-US" sz="2000" dirty="0" smtClean="0"/>
+              <a:t> projections</a:t>
+            </a:r>
+            <a:endParaRPr lang="en-US" sz="2000" dirty="0"/>
+          </a:p>
+        </p:txBody>
+      </p:sp>
+    </p:spTree>
+    <p:extLst>
+      <p:ext uri="{BB962C8B-B14F-4D97-AF65-F5344CB8AC3E}">
+        <p14:creationId xmlns:p14="http://schemas.microsoft.com/office/powerpoint/2010/main" val="2446012117"/>
       </p:ext>
     </p:extLst>
   </p:cSld>

</xml_diff>